<commit_message>
change powerpoint - changed player sprites
</commit_message>
<xml_diff>
--- a/docs/presentation/Adversarial Physics3.pptx
+++ b/docs/presentation/Adversarial Physics3.pptx
@@ -6,10 +6,11 @@
   </p:sldMasterIdLst>
   <p:sldIdLst>
     <p:sldId id="256" r:id="rId2"/>
-    <p:sldId id="268" r:id="rId3"/>
-    <p:sldId id="267" r:id="rId4"/>
-    <p:sldId id="266" r:id="rId5"/>
-    <p:sldId id="265" r:id="rId6"/>
+    <p:sldId id="269" r:id="rId3"/>
+    <p:sldId id="268" r:id="rId4"/>
+    <p:sldId id="267" r:id="rId5"/>
+    <p:sldId id="266" r:id="rId6"/>
+    <p:sldId id="265" r:id="rId7"/>
   </p:sldIdLst>
   <p:sldSz cx="12192000" cy="6858000"/>
   <p:notesSz cx="6858000" cy="9144000"/>
@@ -6085,13 +6086,13 @@
         </p:nvSpPr>
         <p:spPr>
           <a:xfrm>
-            <a:off x="1093305" y="292657"/>
-            <a:ext cx="9448800" cy="1825096"/>
+            <a:off x="1277755" y="0"/>
+            <a:ext cx="9361466" cy="873698"/>
           </a:xfrm>
         </p:spPr>
         <p:txBody>
           <a:bodyPr>
-            <a:normAutofit/>
+            <a:normAutofit fontScale="90000"/>
           </a:bodyPr>
           <a:lstStyle/>
           <a:p>
@@ -6114,7 +6115,7 @@
         </p:nvSpPr>
         <p:spPr>
           <a:xfrm>
-            <a:off x="1477617" y="2756451"/>
+            <a:off x="-2556731" y="1983332"/>
             <a:ext cx="9473095" cy="1992243"/>
           </a:xfrm>
         </p:spPr>
@@ -6261,13 +6262,13 @@
         </p:nvSpPr>
         <p:spPr>
           <a:xfrm>
-            <a:off x="1790700" y="352304"/>
-            <a:ext cx="8610600" cy="1293028"/>
+            <a:off x="1782851" y="122259"/>
+            <a:ext cx="8610600" cy="636745"/>
           </a:xfrm>
         </p:spPr>
         <p:txBody>
           <a:bodyPr>
-            <a:normAutofit/>
+            <a:normAutofit fontScale="90000"/>
           </a:bodyPr>
           <a:lstStyle/>
           <a:p>
@@ -6284,7 +6285,7 @@
                   </a:solidFill>
                 </a:ln>
               </a:rPr>
-              <a:t>Component Breakdown</a:t>
+              <a:t>Player Actions.</a:t>
             </a:r>
           </a:p>
         </p:txBody>
@@ -6427,7 +6428,7 @@
         <p:spPr>
           <a:xfrm>
             <a:off x="2699026" y="3260034"/>
-            <a:ext cx="7377044" cy="369332"/>
+            <a:ext cx="7377044" cy="646331"/>
           </a:xfrm>
           <a:prstGeom prst="rect">
             <a:avLst/>
@@ -6452,7 +6453,314 @@
                   </a:solidFill>
                 </a:ln>
               </a:rPr>
-              <a:t>Forcefields can be placed to block enemy projectiles reflecting them back.</a:t>
+              <a:t>Forcefields can be placed to block enemy projectiles reflecting them back the direction they came.</a:t>
+            </a:r>
+          </a:p>
+        </p:txBody>
+      </p:sp>
+      <p:sp>
+        <p:nvSpPr>
+          <p:cNvPr id="13" name="TextBox 12"/>
+          <p:cNvSpPr txBox="1"/>
+          <p:nvPr/>
+        </p:nvSpPr>
+        <p:spPr>
+          <a:xfrm>
+            <a:off x="2699026" y="4885344"/>
+            <a:ext cx="7443304" cy="646331"/>
+          </a:xfrm>
+          <a:prstGeom prst="rect">
+            <a:avLst/>
+          </a:prstGeom>
+          <a:noFill/>
+        </p:spPr>
+        <p:txBody>
+          <a:bodyPr wrap="square" rtlCol="0">
+            <a:spAutoFit/>
+          </a:bodyPr>
+          <a:lstStyle/>
+          <a:p>
+            <a:r>
+              <a:rPr lang="en-GB" dirty="0">
+                <a:ln w="9525">
+                  <a:solidFill>
+                    <a:schemeClr val="bg1">
+                      <a:lumMod val="75000"/>
+                      <a:lumOff val="25000"/>
+                      <a:alpha val="72000"/>
+                    </a:schemeClr>
+                  </a:solidFill>
+                </a:ln>
+              </a:rPr>
+              <a:t>Singularities can be placed to block enemy asteroids and cause them to spin away randomly.</a:t>
+            </a:r>
+          </a:p>
+        </p:txBody>
+      </p:sp>
+    </p:spTree>
+    <p:extLst>
+      <p:ext uri="{BB962C8B-B14F-4D97-AF65-F5344CB8AC3E}">
+        <p14:creationId xmlns:p14="http://schemas.microsoft.com/office/powerpoint/2010/main" val="1037694975"/>
+      </p:ext>
+    </p:extLst>
+  </p:cSld>
+  <p:clrMapOvr>
+    <a:masterClrMapping/>
+  </p:clrMapOvr>
+</p:sld>
+</file>
+
+<file path=ppt/slides/slide3.xml><?xml version="1.0" encoding="utf-8"?>
+<p:sld xmlns:a="http://schemas.openxmlformats.org/drawingml/2006/main" xmlns:r="http://schemas.openxmlformats.org/officeDocument/2006/relationships" xmlns:p="http://schemas.openxmlformats.org/presentationml/2006/main">
+  <p:cSld>
+    <p:spTree>
+      <p:nvGrpSpPr>
+        <p:cNvPr id="1" name=""/>
+        <p:cNvGrpSpPr/>
+        <p:nvPr/>
+      </p:nvGrpSpPr>
+      <p:grpSpPr>
+        <a:xfrm>
+          <a:off x="0" y="0"/>
+          <a:ext cx="0" cy="0"/>
+          <a:chOff x="0" y="0"/>
+          <a:chExt cx="0" cy="0"/>
+        </a:xfrm>
+      </p:grpSpPr>
+      <p:pic>
+        <p:nvPicPr>
+          <p:cNvPr id="15" name="Picture 14"/>
+          <p:cNvPicPr>
+            <a:picLocks noChangeAspect="1"/>
+          </p:cNvPicPr>
+          <p:nvPr/>
+        </p:nvPicPr>
+        <p:blipFill>
+          <a:blip r:embed="rId2">
+            <a:extLst>
+              <a:ext uri="{28A0092B-C50C-407E-A947-70E740481C1C}">
+                <a14:useLocalDpi xmlns:a14="http://schemas.microsoft.com/office/drawing/2010/main" val="0"/>
+              </a:ext>
+            </a:extLst>
+          </a:blip>
+          <a:stretch>
+            <a:fillRect/>
+          </a:stretch>
+        </p:blipFill>
+        <p:spPr>
+          <a:xfrm>
+            <a:off x="2000250" y="0"/>
+            <a:ext cx="8265764" cy="6858000"/>
+          </a:xfrm>
+          <a:prstGeom prst="rect">
+            <a:avLst/>
+          </a:prstGeom>
+        </p:spPr>
+      </p:pic>
+      <p:sp>
+        <p:nvSpPr>
+          <p:cNvPr id="6" name="Title 1"/>
+          <p:cNvSpPr>
+            <a:spLocks noGrp="1"/>
+          </p:cNvSpPr>
+          <p:nvPr>
+            <p:ph type="title"/>
+          </p:nvPr>
+        </p:nvSpPr>
+        <p:spPr>
+          <a:xfrm>
+            <a:off x="1782851" y="122259"/>
+            <a:ext cx="8610600" cy="636745"/>
+          </a:xfrm>
+        </p:spPr>
+        <p:txBody>
+          <a:bodyPr>
+            <a:normAutofit fontScale="90000"/>
+          </a:bodyPr>
+          <a:lstStyle/>
+          <a:p>
+            <a:pPr algn="ctr"/>
+            <a:r>
+              <a:rPr lang="en-GB" dirty="0">
+                <a:ln w="9525">
+                  <a:solidFill>
+                    <a:schemeClr val="bg1">
+                      <a:lumMod val="75000"/>
+                      <a:lumOff val="25000"/>
+                      <a:alpha val="72000"/>
+                    </a:schemeClr>
+                  </a:solidFill>
+                </a:ln>
+              </a:rPr>
+              <a:t>Component Breakdown</a:t>
+            </a:r>
+          </a:p>
+        </p:txBody>
+      </p:sp>
+      <p:pic>
+        <p:nvPicPr>
+          <p:cNvPr id="7" name="Picture 6"/>
+          <p:cNvPicPr>
+            <a:picLocks noChangeAspect="1"/>
+          </p:cNvPicPr>
+          <p:nvPr/>
+        </p:nvPicPr>
+        <p:blipFill>
+          <a:blip r:embed="rId3">
+            <a:extLst>
+              <a:ext uri="{28A0092B-C50C-407E-A947-70E740481C1C}">
+                <a14:useLocalDpi xmlns:a14="http://schemas.microsoft.com/office/drawing/2010/main" val="0"/>
+              </a:ext>
+            </a:extLst>
+          </a:blip>
+          <a:stretch>
+            <a:fillRect/>
+          </a:stretch>
+        </p:blipFill>
+        <p:spPr>
+          <a:xfrm>
+            <a:off x="733693" y="1645332"/>
+            <a:ext cx="1095107" cy="1095107"/>
+          </a:xfrm>
+          <a:prstGeom prst="rect">
+            <a:avLst/>
+          </a:prstGeom>
+        </p:spPr>
+      </p:pic>
+      <p:pic>
+        <p:nvPicPr>
+          <p:cNvPr id="9" name="Picture 8"/>
+          <p:cNvPicPr>
+            <a:picLocks noChangeAspect="1"/>
+          </p:cNvPicPr>
+          <p:nvPr/>
+        </p:nvPicPr>
+        <p:blipFill>
+          <a:blip r:embed="rId4">
+            <a:extLst>
+              <a:ext uri="{28A0092B-C50C-407E-A947-70E740481C1C}">
+                <a14:useLocalDpi xmlns:a14="http://schemas.microsoft.com/office/drawing/2010/main" val="0"/>
+              </a:ext>
+            </a:extLst>
+          </a:blip>
+          <a:stretch>
+            <a:fillRect/>
+          </a:stretch>
+        </p:blipFill>
+        <p:spPr>
+          <a:xfrm>
+            <a:off x="232630" y="2562415"/>
+            <a:ext cx="2123735" cy="2123735"/>
+          </a:xfrm>
+          <a:prstGeom prst="rect">
+            <a:avLst/>
+          </a:prstGeom>
+        </p:spPr>
+      </p:pic>
+      <p:pic>
+        <p:nvPicPr>
+          <p:cNvPr id="10" name="Picture 9"/>
+          <p:cNvPicPr>
+            <a:picLocks noChangeAspect="1"/>
+          </p:cNvPicPr>
+          <p:nvPr/>
+        </p:nvPicPr>
+        <p:blipFill>
+          <a:blip r:embed="rId5">
+            <a:extLst>
+              <a:ext uri="{28A0092B-C50C-407E-A947-70E740481C1C}">
+                <a14:useLocalDpi xmlns:a14="http://schemas.microsoft.com/office/drawing/2010/main" val="0"/>
+              </a:ext>
+            </a:extLst>
+          </a:blip>
+          <a:stretch>
+            <a:fillRect/>
+          </a:stretch>
+        </p:blipFill>
+        <p:spPr>
+          <a:xfrm>
+            <a:off x="544372" y="4703472"/>
+            <a:ext cx="1332194" cy="1332194"/>
+          </a:xfrm>
+          <a:prstGeom prst="rect">
+            <a:avLst/>
+          </a:prstGeom>
+        </p:spPr>
+      </p:pic>
+      <p:sp>
+        <p:nvSpPr>
+          <p:cNvPr id="11" name="TextBox 10"/>
+          <p:cNvSpPr txBox="1"/>
+          <p:nvPr/>
+        </p:nvSpPr>
+        <p:spPr>
+          <a:xfrm>
+            <a:off x="2699026" y="1766957"/>
+            <a:ext cx="7907131" cy="646331"/>
+          </a:xfrm>
+          <a:prstGeom prst="rect">
+            <a:avLst/>
+          </a:prstGeom>
+          <a:noFill/>
+        </p:spPr>
+        <p:txBody>
+          <a:bodyPr wrap="square" rtlCol="0">
+            <a:spAutoFit/>
+          </a:bodyPr>
+          <a:lstStyle/>
+          <a:p>
+            <a:r>
+              <a:rPr lang="en-GB" dirty="0">
+                <a:ln w="9525">
+                  <a:solidFill>
+                    <a:schemeClr val="bg1">
+                      <a:lumMod val="75000"/>
+                      <a:lumOff val="25000"/>
+                      <a:alpha val="72000"/>
+                    </a:schemeClr>
+                  </a:solidFill>
+                </a:ln>
+              </a:rPr>
+              <a:t>Boosters can be placed in the game to speed up projectiles that fly through them.</a:t>
+            </a:r>
+          </a:p>
+        </p:txBody>
+      </p:sp>
+      <p:sp>
+        <p:nvSpPr>
+          <p:cNvPr id="12" name="TextBox 11"/>
+          <p:cNvSpPr txBox="1"/>
+          <p:nvPr/>
+        </p:nvSpPr>
+        <p:spPr>
+          <a:xfrm>
+            <a:off x="2699026" y="3260034"/>
+            <a:ext cx="7377044" cy="646331"/>
+          </a:xfrm>
+          <a:prstGeom prst="rect">
+            <a:avLst/>
+          </a:prstGeom>
+          <a:noFill/>
+        </p:spPr>
+        <p:txBody>
+          <a:bodyPr wrap="square" rtlCol="0">
+            <a:spAutoFit/>
+          </a:bodyPr>
+          <a:lstStyle/>
+          <a:p>
+            <a:r>
+              <a:rPr lang="en-GB" dirty="0">
+                <a:ln w="9525">
+                  <a:solidFill>
+                    <a:schemeClr val="bg1">
+                      <a:lumMod val="75000"/>
+                      <a:lumOff val="25000"/>
+                      <a:alpha val="72000"/>
+                    </a:schemeClr>
+                  </a:solidFill>
+                </a:ln>
+              </a:rPr>
+              <a:t>Forcefields can be placed to block enemy projectiles reflecting them back the direction they came.</a:t>
             </a:r>
           </a:p>
         </p:txBody>
@@ -6509,7 +6817,7 @@
 </p:sld>
 </file>
 
-<file path=ppt/slides/slide3.xml><?xml version="1.0" encoding="utf-8"?>
+<file path=ppt/slides/slide4.xml><?xml version="1.0" encoding="utf-8"?>
 <p:sld xmlns:a="http://schemas.openxmlformats.org/drawingml/2006/main" xmlns:r="http://schemas.openxmlformats.org/officeDocument/2006/relationships" xmlns:p="http://schemas.openxmlformats.org/presentationml/2006/main">
   <p:cSld>
     <p:spTree>
@@ -6568,8 +6876,8 @@
         </p:nvSpPr>
         <p:spPr>
           <a:xfrm>
-            <a:off x="1790699" y="214948"/>
-            <a:ext cx="8610600" cy="1293028"/>
+            <a:off x="1827832" y="0"/>
+            <a:ext cx="8610600" cy="982995"/>
           </a:xfrm>
         </p:spPr>
         <p:txBody>
@@ -6597,7 +6905,7 @@
 </p:sld>
 </file>
 
-<file path=ppt/slides/slide4.xml><?xml version="1.0" encoding="utf-8"?>
+<file path=ppt/slides/slide5.xml><?xml version="1.0" encoding="utf-8"?>
 <p:sld xmlns:a="http://schemas.openxmlformats.org/drawingml/2006/main" xmlns:r="http://schemas.openxmlformats.org/officeDocument/2006/relationships" xmlns:p="http://schemas.openxmlformats.org/presentationml/2006/main">
   <p:cSld>
     <p:spTree>
@@ -6636,7 +6944,7 @@
         </p:blipFill>
         <p:spPr>
           <a:xfrm>
-            <a:off x="2000250" y="0"/>
+            <a:off x="2000250" y="-54942"/>
             <a:ext cx="8265764" cy="6858000"/>
           </a:xfrm>
           <a:prstGeom prst="rect">
@@ -6656,8 +6964,8 @@
         </p:nvSpPr>
         <p:spPr>
           <a:xfrm>
-            <a:off x="1790700" y="344456"/>
-            <a:ext cx="8610600" cy="1293028"/>
+            <a:off x="1827832" y="0"/>
+            <a:ext cx="8610600" cy="876138"/>
           </a:xfrm>
         </p:spPr>
         <p:txBody>
@@ -6685,7 +6993,7 @@
 </p:sld>
 </file>
 
-<file path=ppt/slides/slide5.xml><?xml version="1.0" encoding="utf-8"?>
+<file path=ppt/slides/slide6.xml><?xml version="1.0" encoding="utf-8"?>
 <p:sld xmlns:a="http://schemas.openxmlformats.org/drawingml/2006/main" xmlns:r="http://schemas.openxmlformats.org/officeDocument/2006/relationships" xmlns:p="http://schemas.openxmlformats.org/presentationml/2006/main">
   <p:cSld>
     <p:spTree>
@@ -6744,12 +7052,14 @@
         </p:nvSpPr>
         <p:spPr>
           <a:xfrm>
-            <a:off x="1790700" y="391549"/>
-            <a:ext cx="8610600" cy="1293028"/>
-          </a:xfrm>
-        </p:spPr>
-        <p:txBody>
-          <a:bodyPr/>
+            <a:off x="1827832" y="109884"/>
+            <a:ext cx="8610600" cy="699537"/>
+          </a:xfrm>
+        </p:spPr>
+        <p:txBody>
+          <a:bodyPr>
+            <a:normAutofit fontScale="90000"/>
+          </a:bodyPr>
           <a:lstStyle/>
           <a:p>
             <a:pPr algn="ctr"/>

</xml_diff>